<commit_message>
Atualiza projeto de sistema bancário.
</commit_message>
<xml_diff>
--- a/projects/01-introducao-tdd/tdd.pptx
+++ b/projects/01-introducao-tdd/tdd.pptx
@@ -221,7 +221,7 @@
           <a:p>
             <a:fld id="{7497B6E1-7C5B-524D-B5EB-5E6695205380}" type="datetimeFigureOut">
               <a:rPr lang="pt-BR" smtClean="0"/>
-              <a:t>28/11/2018</a:t>
+              <a:t>04/12/2018</a:t>
             </a:fld>
             <a:endParaRPr lang="pt-BR"/>
           </a:p>
@@ -659,7 +659,7 @@
           <a:p>
             <a:fld id="{19E7D63B-43B5-8A4C-BD12-76889BE136BD}" type="datetime1">
               <a:rPr lang="en-US" smtClean="0"/>
-              <a:t>11/28/18</a:t>
+              <a:t>12/4/18</a:t>
             </a:fld>
             <a:endParaRPr lang="en-US"/>
           </a:p>
@@ -925,7 +925,7 @@
           <a:p>
             <a:fld id="{124E9894-F119-A64C-B7CB-D7CE860A73BE}" type="datetime1">
               <a:rPr lang="en-US" smtClean="0"/>
-              <a:t>11/28/18</a:t>
+              <a:t>12/4/18</a:t>
             </a:fld>
             <a:endParaRPr lang="en-US"/>
           </a:p>
@@ -1157,7 +1157,7 @@
           <a:p>
             <a:fld id="{124E9894-F119-A64C-B7CB-D7CE860A73BE}" type="datetime1">
               <a:rPr lang="en-US" smtClean="0"/>
-              <a:t>11/28/18</a:t>
+              <a:t>12/4/18</a:t>
             </a:fld>
             <a:endParaRPr lang="en-US"/>
           </a:p>
@@ -1468,7 +1468,7 @@
           <a:p>
             <a:fld id="{124E9894-F119-A64C-B7CB-D7CE860A73BE}" type="datetime1">
               <a:rPr lang="en-US" smtClean="0"/>
-              <a:t>11/28/18</a:t>
+              <a:t>12/4/18</a:t>
             </a:fld>
             <a:endParaRPr lang="en-US"/>
           </a:p>
@@ -1942,7 +1942,7 @@
           <a:p>
             <a:fld id="{B4BBB50B-BAA3-9748-978F-08A7877AB7D9}" type="datetime1">
               <a:rPr lang="en-US" smtClean="0"/>
-              <a:t>11/28/18</a:t>
+              <a:t>12/4/18</a:t>
             </a:fld>
             <a:endParaRPr lang="en-US"/>
           </a:p>
@@ -2489,7 +2489,7 @@
           <a:p>
             <a:fld id="{124E9894-F119-A64C-B7CB-D7CE860A73BE}" type="datetime1">
               <a:rPr lang="en-US" smtClean="0"/>
-              <a:t>11/28/18</a:t>
+              <a:t>12/4/18</a:t>
             </a:fld>
             <a:endParaRPr lang="en-US"/>
           </a:p>
@@ -3261,7 +3261,7 @@
           <a:p>
             <a:fld id="{124E9894-F119-A64C-B7CB-D7CE860A73BE}" type="datetime1">
               <a:rPr lang="en-US" smtClean="0"/>
-              <a:t>11/28/18</a:t>
+              <a:t>12/4/18</a:t>
             </a:fld>
             <a:endParaRPr lang="en-US"/>
           </a:p>
@@ -3437,7 +3437,7 @@
           <a:p>
             <a:fld id="{45040DEA-CE02-EF42-8F10-34F709D8505D}" type="datetime1">
               <a:rPr lang="en-US" smtClean="0"/>
-              <a:t>11/28/18</a:t>
+              <a:t>12/4/18</a:t>
             </a:fld>
             <a:endParaRPr lang="en-US"/>
           </a:p>
@@ -3660,7 +3660,7 @@
           <a:p>
             <a:fld id="{A0C1C801-5706-434E-AB65-DDFBCF1F55D2}" type="datetime1">
               <a:rPr lang="en-US" smtClean="0"/>
-              <a:t>11/28/18</a:t>
+              <a:t>12/4/18</a:t>
             </a:fld>
             <a:endParaRPr lang="en-US"/>
           </a:p>
@@ -3840,7 +3840,7 @@
           <a:p>
             <a:fld id="{39AE0FD8-7D7B-EA4F-8AF8-8B97820A0C5D}" type="datetime1">
               <a:rPr lang="en-US" smtClean="0"/>
-              <a:t>11/28/18</a:t>
+              <a:t>12/4/18</a:t>
             </a:fld>
             <a:endParaRPr lang="en-US"/>
           </a:p>
@@ -4129,7 +4129,7 @@
           <a:p>
             <a:fld id="{7FC94D43-3F68-DC43-8EF0-95FB3D51CCCF}" type="datetime1">
               <a:rPr lang="en-US" smtClean="0"/>
-              <a:t>11/28/18</a:t>
+              <a:t>12/4/18</a:t>
             </a:fld>
             <a:endParaRPr lang="en-US"/>
           </a:p>
@@ -4371,7 +4371,7 @@
           <a:p>
             <a:fld id="{BD42CFC2-1CE8-9045-8C9C-0F183F0FB455}" type="datetime1">
               <a:rPr lang="en-US" smtClean="0"/>
-              <a:t>11/28/18</a:t>
+              <a:t>12/4/18</a:t>
             </a:fld>
             <a:endParaRPr lang="en-US"/>
           </a:p>
@@ -4750,7 +4750,7 @@
           <a:p>
             <a:fld id="{F1B5C6E2-D044-C748-9C41-86C9B2F84EB9}" type="datetime1">
               <a:rPr lang="en-US" smtClean="0"/>
-              <a:t>11/28/18</a:t>
+              <a:t>12/4/18</a:t>
             </a:fld>
             <a:endParaRPr lang="en-US"/>
           </a:p>
@@ -4868,7 +4868,7 @@
           <a:p>
             <a:fld id="{359C32BA-C166-AC45-9FCD-8BF0F43629D9}" type="datetime1">
               <a:rPr lang="en-US" smtClean="0"/>
-              <a:t>11/28/18</a:t>
+              <a:t>12/4/18</a:t>
             </a:fld>
             <a:endParaRPr lang="en-US"/>
           </a:p>
@@ -4963,7 +4963,7 @@
           <a:p>
             <a:fld id="{E5D0D591-4B92-A44B-A0EA-798E76AD0368}" type="datetime1">
               <a:rPr lang="en-US" smtClean="0"/>
-              <a:t>11/28/18</a:t>
+              <a:t>12/4/18</a:t>
             </a:fld>
             <a:endParaRPr lang="en-US"/>
           </a:p>
@@ -5212,7 +5212,7 @@
           <a:p>
             <a:fld id="{8201F472-E17F-4B47-A44B-A2249FA27ED2}" type="datetime1">
               <a:rPr lang="en-US" smtClean="0"/>
-              <a:t>11/28/18</a:t>
+              <a:t>12/4/18</a:t>
             </a:fld>
             <a:endParaRPr lang="en-US"/>
           </a:p>
@@ -5468,7 +5468,7 @@
           <a:p>
             <a:fld id="{8BEFB9EE-CDF2-6F49-80F4-278D1604F10C}" type="datetime1">
               <a:rPr lang="en-US" smtClean="0"/>
-              <a:t>11/28/18</a:t>
+              <a:t>12/4/18</a:t>
             </a:fld>
             <a:endParaRPr lang="en-US"/>
           </a:p>
@@ -5711,7 +5711,7 @@
           <a:p>
             <a:fld id="{124E9894-F119-A64C-B7CB-D7CE860A73BE}" type="datetime1">
               <a:rPr lang="en-US" smtClean="0"/>
-              <a:t>11/28/18</a:t>
+              <a:t>12/4/18</a:t>
             </a:fld>
             <a:endParaRPr lang="en-US"/>
           </a:p>
@@ -13851,8 +13851,8 @@
         </p:nvSpPr>
         <p:spPr>
           <a:xfrm>
-            <a:off x="2589212" y="2358886"/>
-            <a:ext cx="8915400" cy="3777622"/>
+            <a:off x="596348" y="2358886"/>
+            <a:ext cx="10908264" cy="3777622"/>
           </a:xfrm>
         </p:spPr>
         <p:txBody>
@@ -13862,19 +13862,19 @@
           <a:lstStyle/>
           <a:p>
             <a:r>
-              <a:rPr lang="pt-BR" sz="2400" dirty="0"/>
+              <a:rPr lang="pt-BR" sz="2800" dirty="0"/>
               <a:t>Como aprendemos a escrever código?</a:t>
             </a:r>
           </a:p>
           <a:p>
             <a:r>
-              <a:rPr lang="pt-BR" sz="2400" dirty="0"/>
+              <a:rPr lang="pt-BR" sz="2800" dirty="0"/>
               <a:t>Para ficar mais fácil, o que é mesmo um algoritmo?</a:t>
             </a:r>
           </a:p>
           <a:p>
             <a:r>
-              <a:rPr lang="pt-BR" sz="2400" dirty="0"/>
+              <a:rPr lang="pt-BR" sz="2800" dirty="0"/>
               <a:t>Durante o aprendizado de programação, muitas vezes o estudante vê um problema e tenta resolvê-lo como um todo, pensando na solução final completa</a:t>
             </a:r>
           </a:p>
@@ -14001,14 +14001,57 @@
                             </p:stCondLst>
                             <p:childTnLst>
                               <p:par>
-                                <p:cTn id="10" presetID="9" presetClass="entr" presetSubtype="0" fill="hold" grpId="0" nodeType="clickEffect">
+                                <p:cTn id="10" presetID="9" presetClass="exit" presetSubtype="0" fill="hold" grpId="1" nodeType="clickEffect">
+                                  <p:stCondLst>
+                                    <p:cond delay="0"/>
+                                  </p:stCondLst>
+                                  <p:childTnLst>
+                                    <p:animEffect transition="out" filter="dissolve">
+                                      <p:cBhvr>
+                                        <p:cTn id="11" dur="500"/>
+                                        <p:tgtEl>
+                                          <p:spTgt spid="3">
+                                            <p:txEl>
+                                              <p:pRg st="0" end="0"/>
+                                            </p:txEl>
+                                          </p:spTgt>
+                                        </p:tgtEl>
+                                      </p:cBhvr>
+                                    </p:animEffect>
+                                    <p:set>
+                                      <p:cBhvr>
+                                        <p:cTn id="12" dur="1" fill="hold">
+                                          <p:stCondLst>
+                                            <p:cond delay="499"/>
+                                          </p:stCondLst>
+                                        </p:cTn>
+                                        <p:tgtEl>
+                                          <p:spTgt spid="3">
+                                            <p:txEl>
+                                              <p:pRg st="0" end="0"/>
+                                            </p:txEl>
+                                          </p:spTgt>
+                                        </p:tgtEl>
+                                        <p:attrNameLst>
+                                          <p:attrName>style.visibility</p:attrName>
+                                        </p:attrNameLst>
+                                      </p:cBhvr>
+                                      <p:to>
+                                        <p:strVal val="hidden"/>
+                                      </p:to>
+                                    </p:set>
+                                  </p:childTnLst>
+                                </p:cTn>
+                              </p:par>
+                              <p:par>
+                                <p:cTn id="13" presetID="9" presetClass="entr" presetSubtype="0" fill="hold" grpId="0" nodeType="withEffect">
                                   <p:stCondLst>
                                     <p:cond delay="0"/>
                                   </p:stCondLst>
                                   <p:childTnLst>
                                     <p:set>
                                       <p:cBhvr>
-                                        <p:cTn id="11" dur="1" fill="hold">
+                                        <p:cTn id="14" dur="1" fill="hold">
                                           <p:stCondLst>
                                             <p:cond delay="0"/>
                                           </p:stCondLst>
@@ -14030,7 +14073,7 @@
                                     </p:set>
                                     <p:animEffect transition="in" filter="dissolve">
                                       <p:cBhvr>
-                                        <p:cTn id="12" dur="500"/>
+                                        <p:cTn id="15" dur="500"/>
                                         <p:tgtEl>
                                           <p:spTgt spid="3">
                                             <p:txEl>
@@ -14050,26 +14093,69 @@
                     </p:cTn>
                   </p:par>
                   <p:par>
-                    <p:cTn id="13" fill="hold">
+                    <p:cTn id="16" fill="hold">
                       <p:stCondLst>
                         <p:cond delay="indefinite"/>
                       </p:stCondLst>
                       <p:childTnLst>
                         <p:par>
-                          <p:cTn id="14" fill="hold">
+                          <p:cTn id="17" fill="hold">
                             <p:stCondLst>
                               <p:cond delay="0"/>
                             </p:stCondLst>
                             <p:childTnLst>
                               <p:par>
-                                <p:cTn id="15" presetID="9" presetClass="entr" presetSubtype="0" fill="hold" grpId="0" nodeType="clickEffect">
+                                <p:cTn id="18" presetID="9" presetClass="exit" presetSubtype="0" fill="hold" grpId="1" nodeType="clickEffect">
+                                  <p:stCondLst>
+                                    <p:cond delay="0"/>
+                                  </p:stCondLst>
+                                  <p:childTnLst>
+                                    <p:animEffect transition="out" filter="dissolve">
+                                      <p:cBhvr>
+                                        <p:cTn id="19" dur="500"/>
+                                        <p:tgtEl>
+                                          <p:spTgt spid="3">
+                                            <p:txEl>
+                                              <p:pRg st="1" end="1"/>
+                                            </p:txEl>
+                                          </p:spTgt>
+                                        </p:tgtEl>
+                                      </p:cBhvr>
+                                    </p:animEffect>
+                                    <p:set>
+                                      <p:cBhvr>
+                                        <p:cTn id="20" dur="1" fill="hold">
+                                          <p:stCondLst>
+                                            <p:cond delay="499"/>
+                                          </p:stCondLst>
+                                        </p:cTn>
+                                        <p:tgtEl>
+                                          <p:spTgt spid="3">
+                                            <p:txEl>
+                                              <p:pRg st="1" end="1"/>
+                                            </p:txEl>
+                                          </p:spTgt>
+                                        </p:tgtEl>
+                                        <p:attrNameLst>
+                                          <p:attrName>style.visibility</p:attrName>
+                                        </p:attrNameLst>
+                                      </p:cBhvr>
+                                      <p:to>
+                                        <p:strVal val="hidden"/>
+                                      </p:to>
+                                    </p:set>
+                                  </p:childTnLst>
+                                </p:cTn>
+                              </p:par>
+                              <p:par>
+                                <p:cTn id="21" presetID="9" presetClass="entr" presetSubtype="0" fill="hold" grpId="0" nodeType="withEffect">
                                   <p:stCondLst>
                                     <p:cond delay="0"/>
                                   </p:stCondLst>
                                   <p:childTnLst>
                                     <p:set>
                                       <p:cBhvr>
-                                        <p:cTn id="16" dur="1" fill="hold">
+                                        <p:cTn id="22" dur="1" fill="hold">
                                           <p:stCondLst>
                                             <p:cond delay="0"/>
                                           </p:stCondLst>
@@ -14091,7 +14177,7 @@
                                     </p:set>
                                     <p:animEffect transition="in" filter="dissolve">
                                       <p:cBhvr>
-                                        <p:cTn id="17" dur="500"/>
+                                        <p:cTn id="23" dur="500"/>
                                         <p:tgtEl>
                                           <p:spTgt spid="3">
                                             <p:txEl>
@@ -14132,7 +14218,8 @@
       </p:par>
     </p:tnLst>
     <p:bldLst>
-      <p:bldP spid="3" grpId="0" build="p"/>
+      <p:bldP spid="3" grpId="0" uiExpand="1" build="p"/>
+      <p:bldP spid="3" grpId="1" uiExpand="1" build="p"/>
     </p:bldLst>
   </p:timing>
 </p:sld>
@@ -19132,10 +19219,10 @@
           <a:p>
             <a:pPr algn="ctr"/>
             <a:r>
-              <a:rPr lang="pt-BR" b="1" i="1"/>
+              <a:rPr lang="pt-BR" b="1" i="1" dirty="0"/>
               <a:t>O que esse código faz exatamente?</a:t>
             </a:r>
-            <a:endParaRPr lang="pt-BR"/>
+            <a:endParaRPr lang="pt-BR" dirty="0"/>
           </a:p>
         </p:txBody>
       </p:sp>
@@ -19174,31 +19261,31 @@
               <a:buNone/>
             </a:pPr>
             <a:r>
-              <a:rPr lang="en-US"/>
+              <a:rPr lang="en-US" dirty="0"/>
               <a:t>public </a:t>
             </a:r>
             <a:r>
-              <a:rPr lang="en-US" err="1"/>
+              <a:rPr lang="en-US" dirty="0" err="1"/>
               <a:t>boolean</a:t>
             </a:r>
             <a:r>
-              <a:rPr lang="en-US"/>
+              <a:rPr lang="en-US" dirty="0"/>
               <a:t> </a:t>
             </a:r>
             <a:r>
-              <a:rPr lang="en-US" err="1"/>
+              <a:rPr lang="en-US" dirty="0" err="1"/>
               <a:t>isCpfValido</a:t>
             </a:r>
             <a:r>
-              <a:rPr lang="en-US"/>
+              <a:rPr lang="en-US" dirty="0"/>
               <a:t>(String </a:t>
             </a:r>
             <a:r>
-              <a:rPr lang="en-US" err="1"/>
+              <a:rPr lang="en-US" dirty="0" err="1"/>
               <a:t>cpf</a:t>
             </a:r>
             <a:r>
-              <a:rPr lang="en-US"/>
+              <a:rPr lang="en-US" dirty="0"/>
               <a:t>) {</a:t>
             </a:r>
           </a:p>
@@ -19207,15 +19294,15 @@
               <a:buNone/>
             </a:pPr>
             <a:r>
-              <a:rPr lang="en-US"/>
+              <a:rPr lang="en-US" dirty="0"/>
               <a:t>  </a:t>
             </a:r>
             <a:r>
-              <a:rPr lang="en-US" err="1"/>
+              <a:rPr lang="en-US" dirty="0" err="1"/>
               <a:t>int</a:t>
             </a:r>
             <a:r>
-              <a:rPr lang="en-US"/>
+              <a:rPr lang="en-US" dirty="0"/>
               <a:t> d1, d2, resto, d;</a:t>
             </a:r>
           </a:p>
@@ -19224,7 +19311,7 @@
               <a:buNone/>
             </a:pPr>
             <a:r>
-              <a:rPr lang="en-US"/>
+              <a:rPr lang="en-US" dirty="0"/>
               <a:t>  String res, v;</a:t>
             </a:r>
           </a:p>
@@ -19233,7 +19320,7 @@
               <a:buNone/>
             </a:pPr>
             <a:r>
-              <a:rPr lang="en-US"/>
+              <a:rPr lang="en-US" dirty="0"/>
               <a:t>  d1 = d2 = 0;</a:t>
             </a:r>
           </a:p>
@@ -19242,7 +19329,7 @@
               <a:buNone/>
             </a:pPr>
             <a:r>
-              <a:rPr lang="en-US"/>
+              <a:rPr lang="en-US" dirty="0"/>
               <a:t>  digito1 = digito2 = resto = 0;</a:t>
             </a:r>
           </a:p>
@@ -19250,63 +19337,70 @@
             <a:pPr marL="0" indent="0">
               <a:buNone/>
             </a:pPr>
-            <a:endParaRPr lang="en-US"/>
+            <a:endParaRPr lang="en-US" dirty="0"/>
           </a:p>
           <a:p>
             <a:pPr marL="0" indent="0">
               <a:buNone/>
             </a:pPr>
             <a:r>
-              <a:rPr lang="en-US"/>
+              <a:rPr lang="en-US" dirty="0"/>
               <a:t>  for (</a:t>
             </a:r>
             <a:r>
-              <a:rPr lang="en-US" err="1"/>
+              <a:rPr lang="en-US" dirty="0" err="1"/>
               <a:t>int</a:t>
             </a:r>
             <a:r>
-              <a:rPr lang="en-US"/>
+              <a:rPr lang="en-US" dirty="0"/>
               <a:t> n = 1; count &lt; </a:t>
             </a:r>
             <a:r>
-              <a:rPr lang="en-US" err="1"/>
+              <a:rPr lang="en-US" dirty="0" err="1"/>
               <a:t>cpf.length</a:t>
             </a:r>
             <a:r>
-              <a:rPr lang="en-US"/>
+              <a:rPr lang="en-US" dirty="0"/>
               <a:t>() - 1; n++) {</a:t>
             </a:r>
+            <a:br>
+              <a:rPr lang="en-US" dirty="0"/>
+            </a:br>
+            <a:r>
+              <a:rPr lang="en-US" dirty="0"/>
+              <a:t>   String s = </a:t>
+            </a:r>
+            <a:r>
+              <a:rPr lang="en-US" dirty="0" err="1"/>
+              <a:t>cpf.substring</a:t>
+            </a:r>
+            <a:r>
+              <a:rPr lang="en-US" dirty="0"/>
+              <a:t>(n - 1, n);</a:t>
+            </a:r>
           </a:p>
           <a:p>
             <a:pPr marL="0" indent="0">
               <a:buNone/>
             </a:pPr>
             <a:r>
-              <a:rPr lang="en-US"/>
+              <a:rPr lang="en-US" dirty="0"/>
               <a:t>   d = </a:t>
             </a:r>
             <a:r>
-              <a:rPr lang="en-US" err="1"/>
+              <a:rPr lang="en-US" dirty="0" err="1"/>
               <a:t>Integer.valueOf</a:t>
             </a:r>
             <a:r>
-              <a:rPr lang="en-US"/>
-              <a:t>(</a:t>
-            </a:r>
-            <a:r>
-              <a:rPr lang="en-US" err="1"/>
-              <a:t>cpf.substring</a:t>
-            </a:r>
-            <a:r>
-              <a:rPr lang="en-US"/>
-              <a:t>(n - 1, n)).</a:t>
-            </a:r>
-            <a:r>
-              <a:rPr lang="en-US" err="1"/>
+              <a:rPr lang="en-US" dirty="0"/>
+              <a:t>(s).</a:t>
+            </a:r>
+            <a:r>
+              <a:rPr lang="en-US" dirty="0" err="1"/>
               <a:t>intValue</a:t>
             </a:r>
             <a:r>
-              <a:rPr lang="en-US"/>
+              <a:rPr lang="en-US" dirty="0"/>
               <a:t>();</a:t>
             </a:r>
           </a:p>
@@ -19315,7 +19409,7 @@
               <a:buNone/>
             </a:pPr>
             <a:r>
-              <a:rPr lang="en-US"/>
+              <a:rPr lang="en-US" dirty="0"/>
               <a:t>   d1 = d1 + (11 - count) * d;</a:t>
             </a:r>
           </a:p>
@@ -19324,7 +19418,7 @@
               <a:buNone/>
             </a:pPr>
             <a:r>
-              <a:rPr lang="en-US"/>
+              <a:rPr lang="en-US" dirty="0"/>
               <a:t>   d2 = d2 + (12 - count) * d;</a:t>
             </a:r>
           </a:p>
@@ -19333,7 +19427,7 @@
               <a:buNone/>
             </a:pPr>
             <a:r>
-              <a:rPr lang="en-US"/>
+              <a:rPr lang="en-US" dirty="0"/>
               <a:t>  }</a:t>
             </a:r>
           </a:p>
@@ -20097,31 +20191,31 @@
               <a:buNone/>
             </a:pPr>
             <a:r>
-              <a:rPr lang="en-US"/>
+              <a:rPr lang="en-US" dirty="0"/>
               <a:t>public </a:t>
             </a:r>
             <a:r>
-              <a:rPr lang="en-US" err="1"/>
+              <a:rPr lang="en-US" dirty="0" err="1"/>
               <a:t>boolean</a:t>
             </a:r>
             <a:r>
-              <a:rPr lang="en-US"/>
+              <a:rPr lang="en-US" dirty="0"/>
               <a:t> </a:t>
             </a:r>
             <a:r>
-              <a:rPr lang="en-US" err="1"/>
+              <a:rPr lang="en-US" dirty="0" err="1"/>
               <a:t>isCpfValido</a:t>
             </a:r>
             <a:r>
-              <a:rPr lang="en-US"/>
+              <a:rPr lang="en-US" dirty="0"/>
               <a:t>(String </a:t>
             </a:r>
             <a:r>
-              <a:rPr lang="en-US" err="1"/>
+              <a:rPr lang="en-US" dirty="0" err="1"/>
               <a:t>cpf</a:t>
             </a:r>
             <a:r>
-              <a:rPr lang="en-US"/>
+              <a:rPr lang="en-US" dirty="0"/>
               <a:t>) {</a:t>
             </a:r>
           </a:p>
@@ -20130,31 +20224,31 @@
               <a:buNone/>
             </a:pPr>
             <a:r>
-              <a:rPr lang="en-US"/>
+              <a:rPr lang="en-US" dirty="0"/>
               <a:t>  //Remove </a:t>
             </a:r>
             <a:r>
-              <a:rPr lang="en-US" err="1"/>
+              <a:rPr lang="en-US" dirty="0" err="1"/>
               <a:t>caracteres</a:t>
             </a:r>
             <a:r>
-              <a:rPr lang="en-US"/>
+              <a:rPr lang="en-US" dirty="0"/>
               <a:t> </a:t>
             </a:r>
             <a:r>
-              <a:rPr lang="en-US" err="1"/>
+              <a:rPr lang="en-US" dirty="0" err="1"/>
               <a:t>não</a:t>
             </a:r>
             <a:r>
-              <a:rPr lang="en-US"/>
+              <a:rPr lang="en-US" dirty="0"/>
               <a:t> </a:t>
             </a:r>
             <a:r>
-              <a:rPr lang="en-US" err="1"/>
+              <a:rPr lang="en-US" dirty="0" err="1"/>
               <a:t>numéricos</a:t>
             </a:r>
             <a:r>
-              <a:rPr lang="en-US"/>
+              <a:rPr lang="en-US" dirty="0"/>
               <a:t> do CPF </a:t>
             </a:r>
           </a:p>
@@ -20163,23 +20257,23 @@
               <a:buNone/>
             </a:pPr>
             <a:r>
-              <a:rPr lang="en-US"/>
+              <a:rPr lang="en-US" dirty="0"/>
               <a:t>  </a:t>
             </a:r>
             <a:r>
-              <a:rPr lang="en-US" err="1"/>
+              <a:rPr lang="en-US" dirty="0" err="1"/>
               <a:t>cpf</a:t>
             </a:r>
             <a:r>
-              <a:rPr lang="en-US"/>
+              <a:rPr lang="en-US" dirty="0"/>
               <a:t> = </a:t>
             </a:r>
             <a:r>
-              <a:rPr lang="en-US" err="1"/>
+              <a:rPr lang="en-US" dirty="0" err="1"/>
               <a:t>cpf.replaceAll</a:t>
             </a:r>
             <a:r>
-              <a:rPr lang="en-US"/>
+              <a:rPr lang="en-US" dirty="0"/>
               <a:t>("\\D", "");</a:t>
             </a:r>
           </a:p>
@@ -20188,19 +20282,19 @@
               <a:buNone/>
             </a:pPr>
             <a:br>
-              <a:rPr lang="en-US"/>
+              <a:rPr lang="en-US" dirty="0"/>
             </a:br>
             <a:r>
-              <a:rPr lang="en-US"/>
+              <a:rPr lang="en-US" dirty="0"/>
               <a:t>  if (</a:t>
             </a:r>
             <a:r>
-              <a:rPr lang="en-US" err="1"/>
+              <a:rPr lang="en-US" dirty="0" err="1"/>
               <a:t>cpf.length</a:t>
             </a:r>
             <a:r>
-              <a:rPr lang="en-US"/>
-              <a:t>() != 11)</a:t>
+              <a:rPr lang="en-US" dirty="0"/>
+              <a:t>() != 11){</a:t>
             </a:r>
           </a:p>
           <a:p>
@@ -20208,8 +20302,81 @@
               <a:buNone/>
             </a:pPr>
             <a:r>
-              <a:rPr lang="en-US"/>
+              <a:rPr lang="en-US" dirty="0"/>
               <a:t>      return false;</a:t>
+            </a:r>
+          </a:p>
+          <a:p>
+            <a:pPr marL="0" indent="0">
+              <a:buNone/>
+            </a:pPr>
+            <a:r>
+              <a:rPr lang="en-US" dirty="0"/>
+              <a:t>  }</a:t>
+            </a:r>
+            <a:br>
+              <a:rPr lang="en-US" dirty="0"/>
+            </a:br>
+            <a:r>
+              <a:rPr lang="en-US" dirty="0"/>
+              <a:t>  </a:t>
+            </a:r>
+            <a:r>
+              <a:rPr lang="en-US" dirty="0" err="1"/>
+              <a:t>int</a:t>
+            </a:r>
+            <a:r>
+              <a:rPr lang="en-US" dirty="0"/>
+              <a:t> d1 = </a:t>
+            </a:r>
+            <a:r>
+              <a:rPr lang="en-US" dirty="0" err="1"/>
+              <a:t>calculaDigito</a:t>
+            </a:r>
+            <a:r>
+              <a:rPr lang="en-US" dirty="0"/>
+              <a:t>(</a:t>
+            </a:r>
+            <a:r>
+              <a:rPr lang="en-US" dirty="0" err="1"/>
+              <a:t>cpf</a:t>
+            </a:r>
+            <a:r>
+              <a:rPr lang="en-US" dirty="0"/>
+              <a:t>, 9);</a:t>
+            </a:r>
+          </a:p>
+          <a:p>
+            <a:pPr marL="0" indent="0">
+              <a:buNone/>
+            </a:pPr>
+            <a:r>
+              <a:rPr lang="en-US" dirty="0"/>
+              <a:t>  </a:t>
+            </a:r>
+            <a:r>
+              <a:rPr lang="en-US" dirty="0" err="1"/>
+              <a:t>int</a:t>
+            </a:r>
+            <a:r>
+              <a:rPr lang="en-US" dirty="0"/>
+              <a:t> d2 = </a:t>
+            </a:r>
+            <a:r>
+              <a:rPr lang="en-US" dirty="0" err="1"/>
+              <a:t>calculaDigito</a:t>
+            </a:r>
+            <a:r>
+              <a:rPr lang="en-US" dirty="0"/>
+              <a:t>(</a:t>
+            </a:r>
+            <a:r>
+              <a:rPr lang="en-US" dirty="0" err="1"/>
+              <a:t>cpf</a:t>
+            </a:r>
+            <a:r>
+              <a:rPr lang="en-US" dirty="0"/>
+              <a:t>, 10);</a:t>
             </a:r>
           </a:p>
           <a:p>
@@ -20217,78 +20384,9 @@
               <a:buNone/>
             </a:pPr>
             <a:br>
-              <a:rPr lang="en-US"/>
+              <a:rPr lang="en-US" dirty="0"/>
             </a:br>
-            <a:r>
-              <a:rPr lang="en-US"/>
-              <a:t>  </a:t>
-            </a:r>
-            <a:r>
-              <a:rPr lang="en-US" err="1"/>
-              <a:t>int</a:t>
-            </a:r>
-            <a:r>
-              <a:rPr lang="en-US"/>
-              <a:t> d1 = </a:t>
-            </a:r>
-            <a:r>
-              <a:rPr lang="en-US" err="1"/>
-              <a:t>calculaDigito</a:t>
-            </a:r>
-            <a:r>
-              <a:rPr lang="en-US"/>
-              <a:t>(</a:t>
-            </a:r>
-            <a:r>
-              <a:rPr lang="en-US" err="1"/>
-              <a:t>cpf</a:t>
-            </a:r>
-            <a:r>
-              <a:rPr lang="en-US"/>
-              <a:t>, 9);</a:t>
-            </a:r>
-          </a:p>
-          <a:p>
-            <a:pPr marL="0" indent="0">
-              <a:buNone/>
-            </a:pPr>
-            <a:r>
-              <a:rPr lang="en-US"/>
-              <a:t>  </a:t>
-            </a:r>
-            <a:r>
-              <a:rPr lang="en-US" err="1"/>
-              <a:t>int</a:t>
-            </a:r>
-            <a:r>
-              <a:rPr lang="en-US"/>
-              <a:t> d2 = </a:t>
-            </a:r>
-            <a:r>
-              <a:rPr lang="en-US" err="1"/>
-              <a:t>calculaDigito</a:t>
-            </a:r>
-            <a:r>
-              <a:rPr lang="en-US"/>
-              <a:t>(</a:t>
-            </a:r>
-            <a:r>
-              <a:rPr lang="en-US" err="1"/>
-              <a:t>cpf</a:t>
-            </a:r>
-            <a:r>
-              <a:rPr lang="en-US"/>
-              <a:t>, 10);</a:t>
-            </a:r>
-          </a:p>
-          <a:p>
-            <a:pPr marL="0" indent="0">
-              <a:buNone/>
-            </a:pPr>
-            <a:br>
-              <a:rPr lang="en-US"/>
-            </a:br>
-            <a:endParaRPr lang="en-US"/>
+            <a:endParaRPr lang="en-US" dirty="0"/>
           </a:p>
         </p:txBody>
       </p:sp>
@@ -24862,12 +24960,12 @@
 <file path=ppt/theme/theme1.xml><?xml version="1.0" encoding="utf-8"?>
 <a:theme xmlns:a="http://schemas.openxmlformats.org/drawingml/2006/main" name="Vapor Trail">
   <a:themeElements>
-    <a:clrScheme name="Vapor Trail">
+    <a:clrScheme name="Custom 6 2">
       <a:dk1>
-        <a:sysClr val="windowText" lastClr="000000"/>
+        <a:srgbClr val="000000"/>
       </a:dk1>
       <a:lt1>
-        <a:sysClr val="window" lastClr="FFFFFF"/>
+        <a:srgbClr val="FFFFFF"/>
       </a:lt1>
       <a:dk2>
         <a:srgbClr val="454545"/>
@@ -24894,10 +24992,10 @@
         <a:srgbClr val="4A9BDC"/>
       </a:accent6>
       <a:hlink>
-        <a:srgbClr val="F0532B"/>
+        <a:srgbClr val="0432FF"/>
       </a:hlink>
       <a:folHlink>
-        <a:srgbClr val="F38B53"/>
+        <a:srgbClr val="0432FF"/>
       </a:folHlink>
     </a:clrScheme>
     <a:fontScheme name="Vapor Trail">

</xml_diff>